<commit_message>
Changed color of descriptions in appendix. Added 'Advantages' and 'Disadvantages' to powerpoint.
</commit_message>
<xml_diff>
--- a/Naive Bayes Notes.pptx
+++ b/Naive Bayes Notes.pptx
@@ -4,11 +4,16 @@
   <p:sldMasterIdLst>
     <p:sldMasterId id="2147483660" r:id="rId4"/>
   </p:sldMasterIdLst>
+  <p:notesMasterIdLst>
+    <p:notesMasterId r:id="rId11"/>
+  </p:notesMasterIdLst>
   <p:sldIdLst>
     <p:sldId id="301" r:id="rId5"/>
     <p:sldId id="302" r:id="rId6"/>
     <p:sldId id="303" r:id="rId7"/>
     <p:sldId id="304" r:id="rId8"/>
+    <p:sldId id="306" r:id="rId9"/>
+    <p:sldId id="307" r:id="rId10"/>
   </p:sldIdLst>
   <p:sldSz cx="12192000" cy="6858000"/>
   <p:notesSz cx="6858000" cy="9144000"/>
@@ -113,6 +118,355 @@
     </p:ext>
   </p:extLst>
 </p:presentation>
+</file>
+
+<file path=ppt/notesMasters/notesMaster1.xml><?xml version="1.0" encoding="utf-8"?>
+<p:notesMaster xmlns:a="http://schemas.openxmlformats.org/drawingml/2006/main" xmlns:r="http://schemas.openxmlformats.org/officeDocument/2006/relationships" xmlns:p="http://schemas.openxmlformats.org/presentationml/2006/main">
+  <p:cSld>
+    <p:bg>
+      <p:bgRef idx="1001">
+        <a:schemeClr val="bg1"/>
+      </p:bgRef>
+    </p:bg>
+    <p:spTree>
+      <p:nvGrpSpPr>
+        <p:cNvPr id="1" name=""/>
+        <p:cNvGrpSpPr/>
+        <p:nvPr/>
+      </p:nvGrpSpPr>
+      <p:grpSpPr>
+        <a:xfrm>
+          <a:off x="0" y="0"/>
+          <a:ext cx="0" cy="0"/>
+          <a:chOff x="0" y="0"/>
+          <a:chExt cx="0" cy="0"/>
+        </a:xfrm>
+      </p:grpSpPr>
+      <p:sp>
+        <p:nvSpPr>
+          <p:cNvPr id="2" name="Header Placeholder 1"/>
+          <p:cNvSpPr>
+            <a:spLocks noGrp="1"/>
+          </p:cNvSpPr>
+          <p:nvPr>
+            <p:ph type="hdr" sz="quarter"/>
+          </p:nvPr>
+        </p:nvSpPr>
+        <p:spPr>
+          <a:xfrm>
+            <a:off x="0" y="0"/>
+            <a:ext cx="2971800" cy="458788"/>
+          </a:xfrm>
+          <a:prstGeom prst="rect">
+            <a:avLst/>
+          </a:prstGeom>
+        </p:spPr>
+        <p:txBody>
+          <a:bodyPr vert="horz" lIns="91440" tIns="45720" rIns="91440" bIns="45720" rtlCol="0"/>
+          <a:lstStyle>
+            <a:lvl1pPr algn="l">
+              <a:defRPr sz="1200"/>
+            </a:lvl1pPr>
+          </a:lstStyle>
+          <a:p>
+            <a:endParaRPr lang="en-US"/>
+          </a:p>
+        </p:txBody>
+      </p:sp>
+      <p:sp>
+        <p:nvSpPr>
+          <p:cNvPr id="3" name="Date Placeholder 2"/>
+          <p:cNvSpPr>
+            <a:spLocks noGrp="1"/>
+          </p:cNvSpPr>
+          <p:nvPr>
+            <p:ph type="dt" idx="1"/>
+          </p:nvPr>
+        </p:nvSpPr>
+        <p:spPr>
+          <a:xfrm>
+            <a:off x="3884613" y="0"/>
+            <a:ext cx="2971800" cy="458788"/>
+          </a:xfrm>
+          <a:prstGeom prst="rect">
+            <a:avLst/>
+          </a:prstGeom>
+        </p:spPr>
+        <p:txBody>
+          <a:bodyPr vert="horz" lIns="91440" tIns="45720" rIns="91440" bIns="45720" rtlCol="0"/>
+          <a:lstStyle>
+            <a:lvl1pPr algn="r">
+              <a:defRPr sz="1200"/>
+            </a:lvl1pPr>
+          </a:lstStyle>
+          <a:p>
+            <a:fld id="{2010C0D1-B5F4-4434-AB6E-84D8CB94855D}" type="datetimeFigureOut">
+              <a:rPr lang="en-US" smtClean="0"/>
+              <a:t>4/28/2022</a:t>
+            </a:fld>
+            <a:endParaRPr lang="en-US"/>
+          </a:p>
+        </p:txBody>
+      </p:sp>
+      <p:sp>
+        <p:nvSpPr>
+          <p:cNvPr id="4" name="Slide Image Placeholder 3"/>
+          <p:cNvSpPr>
+            <a:spLocks noGrp="1" noRot="1" noChangeAspect="1"/>
+          </p:cNvSpPr>
+          <p:nvPr>
+            <p:ph type="sldImg" idx="2"/>
+          </p:nvPr>
+        </p:nvSpPr>
+        <p:spPr>
+          <a:xfrm>
+            <a:off x="685800" y="1143000"/>
+            <a:ext cx="5486400" cy="3086100"/>
+          </a:xfrm>
+          <a:prstGeom prst="rect">
+            <a:avLst/>
+          </a:prstGeom>
+          <a:noFill/>
+          <a:ln w="12700">
+            <a:solidFill>
+              <a:prstClr val="black"/>
+            </a:solidFill>
+          </a:ln>
+        </p:spPr>
+        <p:txBody>
+          <a:bodyPr vert="horz" lIns="91440" tIns="45720" rIns="91440" bIns="45720" rtlCol="0" anchor="ctr"/>
+          <a:lstStyle/>
+          <a:p>
+            <a:endParaRPr lang="en-US"/>
+          </a:p>
+        </p:txBody>
+      </p:sp>
+      <p:sp>
+        <p:nvSpPr>
+          <p:cNvPr id="5" name="Notes Placeholder 4"/>
+          <p:cNvSpPr>
+            <a:spLocks noGrp="1"/>
+          </p:cNvSpPr>
+          <p:nvPr>
+            <p:ph type="body" sz="quarter" idx="3"/>
+          </p:nvPr>
+        </p:nvSpPr>
+        <p:spPr>
+          <a:xfrm>
+            <a:off x="685800" y="4400550"/>
+            <a:ext cx="5486400" cy="3600450"/>
+          </a:xfrm>
+          <a:prstGeom prst="rect">
+            <a:avLst/>
+          </a:prstGeom>
+        </p:spPr>
+        <p:txBody>
+          <a:bodyPr vert="horz" lIns="91440" tIns="45720" rIns="91440" bIns="45720" rtlCol="0"/>
+          <a:lstStyle/>
+          <a:p>
+            <a:pPr lvl="0"/>
+            <a:r>
+              <a:rPr lang="en-US"/>
+              <a:t>Click to edit Master text styles</a:t>
+            </a:r>
+          </a:p>
+          <a:p>
+            <a:pPr lvl="1"/>
+            <a:r>
+              <a:rPr lang="en-US"/>
+              <a:t>Second level</a:t>
+            </a:r>
+          </a:p>
+          <a:p>
+            <a:pPr lvl="2"/>
+            <a:r>
+              <a:rPr lang="en-US"/>
+              <a:t>Third level</a:t>
+            </a:r>
+          </a:p>
+          <a:p>
+            <a:pPr lvl="3"/>
+            <a:r>
+              <a:rPr lang="en-US"/>
+              <a:t>Fourth level</a:t>
+            </a:r>
+          </a:p>
+          <a:p>
+            <a:pPr lvl="4"/>
+            <a:r>
+              <a:rPr lang="en-US"/>
+              <a:t>Fifth level</a:t>
+            </a:r>
+          </a:p>
+        </p:txBody>
+      </p:sp>
+      <p:sp>
+        <p:nvSpPr>
+          <p:cNvPr id="6" name="Footer Placeholder 5"/>
+          <p:cNvSpPr>
+            <a:spLocks noGrp="1"/>
+          </p:cNvSpPr>
+          <p:nvPr>
+            <p:ph type="ftr" sz="quarter" idx="4"/>
+          </p:nvPr>
+        </p:nvSpPr>
+        <p:spPr>
+          <a:xfrm>
+            <a:off x="0" y="8685213"/>
+            <a:ext cx="2971800" cy="458787"/>
+          </a:xfrm>
+          <a:prstGeom prst="rect">
+            <a:avLst/>
+          </a:prstGeom>
+        </p:spPr>
+        <p:txBody>
+          <a:bodyPr vert="horz" lIns="91440" tIns="45720" rIns="91440" bIns="45720" rtlCol="0" anchor="b"/>
+          <a:lstStyle>
+            <a:lvl1pPr algn="l">
+              <a:defRPr sz="1200"/>
+            </a:lvl1pPr>
+          </a:lstStyle>
+          <a:p>
+            <a:endParaRPr lang="en-US"/>
+          </a:p>
+        </p:txBody>
+      </p:sp>
+      <p:sp>
+        <p:nvSpPr>
+          <p:cNvPr id="7" name="Slide Number Placeholder 6"/>
+          <p:cNvSpPr>
+            <a:spLocks noGrp="1"/>
+          </p:cNvSpPr>
+          <p:nvPr>
+            <p:ph type="sldNum" sz="quarter" idx="5"/>
+          </p:nvPr>
+        </p:nvSpPr>
+        <p:spPr>
+          <a:xfrm>
+            <a:off x="3884613" y="8685213"/>
+            <a:ext cx="2971800" cy="458787"/>
+          </a:xfrm>
+          <a:prstGeom prst="rect">
+            <a:avLst/>
+          </a:prstGeom>
+        </p:spPr>
+        <p:txBody>
+          <a:bodyPr vert="horz" lIns="91440" tIns="45720" rIns="91440" bIns="45720" rtlCol="0" anchor="b"/>
+          <a:lstStyle>
+            <a:lvl1pPr algn="r">
+              <a:defRPr sz="1200"/>
+            </a:lvl1pPr>
+          </a:lstStyle>
+          <a:p>
+            <a:fld id="{970F265A-DF8F-492B-8BD5-550FB637DA9B}" type="slidenum">
+              <a:rPr lang="en-US" smtClean="0"/>
+              <a:t>‹#›</a:t>
+            </a:fld>
+            <a:endParaRPr lang="en-US"/>
+          </a:p>
+        </p:txBody>
+      </p:sp>
+    </p:spTree>
+    <p:extLst>
+      <p:ext uri="{BB962C8B-B14F-4D97-AF65-F5344CB8AC3E}">
+        <p14:creationId xmlns:p14="http://schemas.microsoft.com/office/powerpoint/2010/main" val="1063260589"/>
+      </p:ext>
+    </p:extLst>
+  </p:cSld>
+  <p:clrMap bg1="lt1" tx1="dk1" bg2="lt2" tx2="dk2" accent1="accent1" accent2="accent2" accent3="accent3" accent4="accent4" accent5="accent5" accent6="accent6" hlink="hlink" folHlink="folHlink"/>
+  <p:notesStyle>
+    <a:lvl1pPr marL="0" algn="l" defTabSz="914400" rtl="0" eaLnBrk="1" latinLnBrk="0" hangingPunct="1">
+      <a:defRPr sz="1200" kern="1200">
+        <a:solidFill>
+          <a:schemeClr val="tx1"/>
+        </a:solidFill>
+        <a:latin typeface="+mn-lt"/>
+        <a:ea typeface="+mn-ea"/>
+        <a:cs typeface="+mn-cs"/>
+      </a:defRPr>
+    </a:lvl1pPr>
+    <a:lvl2pPr marL="457200" algn="l" defTabSz="914400" rtl="0" eaLnBrk="1" latinLnBrk="0" hangingPunct="1">
+      <a:defRPr sz="1200" kern="1200">
+        <a:solidFill>
+          <a:schemeClr val="tx1"/>
+        </a:solidFill>
+        <a:latin typeface="+mn-lt"/>
+        <a:ea typeface="+mn-ea"/>
+        <a:cs typeface="+mn-cs"/>
+      </a:defRPr>
+    </a:lvl2pPr>
+    <a:lvl3pPr marL="914400" algn="l" defTabSz="914400" rtl="0" eaLnBrk="1" latinLnBrk="0" hangingPunct="1">
+      <a:defRPr sz="1200" kern="1200">
+        <a:solidFill>
+          <a:schemeClr val="tx1"/>
+        </a:solidFill>
+        <a:latin typeface="+mn-lt"/>
+        <a:ea typeface="+mn-ea"/>
+        <a:cs typeface="+mn-cs"/>
+      </a:defRPr>
+    </a:lvl3pPr>
+    <a:lvl4pPr marL="1371600" algn="l" defTabSz="914400" rtl="0" eaLnBrk="1" latinLnBrk="0" hangingPunct="1">
+      <a:defRPr sz="1200" kern="1200">
+        <a:solidFill>
+          <a:schemeClr val="tx1"/>
+        </a:solidFill>
+        <a:latin typeface="+mn-lt"/>
+        <a:ea typeface="+mn-ea"/>
+        <a:cs typeface="+mn-cs"/>
+      </a:defRPr>
+    </a:lvl4pPr>
+    <a:lvl5pPr marL="1828800" algn="l" defTabSz="914400" rtl="0" eaLnBrk="1" latinLnBrk="0" hangingPunct="1">
+      <a:defRPr sz="1200" kern="1200">
+        <a:solidFill>
+          <a:schemeClr val="tx1"/>
+        </a:solidFill>
+        <a:latin typeface="+mn-lt"/>
+        <a:ea typeface="+mn-ea"/>
+        <a:cs typeface="+mn-cs"/>
+      </a:defRPr>
+    </a:lvl5pPr>
+    <a:lvl6pPr marL="2286000" algn="l" defTabSz="914400" rtl="0" eaLnBrk="1" latinLnBrk="0" hangingPunct="1">
+      <a:defRPr sz="1200" kern="1200">
+        <a:solidFill>
+          <a:schemeClr val="tx1"/>
+        </a:solidFill>
+        <a:latin typeface="+mn-lt"/>
+        <a:ea typeface="+mn-ea"/>
+        <a:cs typeface="+mn-cs"/>
+      </a:defRPr>
+    </a:lvl6pPr>
+    <a:lvl7pPr marL="2743200" algn="l" defTabSz="914400" rtl="0" eaLnBrk="1" latinLnBrk="0" hangingPunct="1">
+      <a:defRPr sz="1200" kern="1200">
+        <a:solidFill>
+          <a:schemeClr val="tx1"/>
+        </a:solidFill>
+        <a:latin typeface="+mn-lt"/>
+        <a:ea typeface="+mn-ea"/>
+        <a:cs typeface="+mn-cs"/>
+      </a:defRPr>
+    </a:lvl7pPr>
+    <a:lvl8pPr marL="3200400" algn="l" defTabSz="914400" rtl="0" eaLnBrk="1" latinLnBrk="0" hangingPunct="1">
+      <a:defRPr sz="1200" kern="1200">
+        <a:solidFill>
+          <a:schemeClr val="tx1"/>
+        </a:solidFill>
+        <a:latin typeface="+mn-lt"/>
+        <a:ea typeface="+mn-ea"/>
+        <a:cs typeface="+mn-cs"/>
+      </a:defRPr>
+    </a:lvl8pPr>
+    <a:lvl9pPr marL="3657600" algn="l" defTabSz="914400" rtl="0" eaLnBrk="1" latinLnBrk="0" hangingPunct="1">
+      <a:defRPr sz="1200" kern="1200">
+        <a:solidFill>
+          <a:schemeClr val="tx1"/>
+        </a:solidFill>
+        <a:latin typeface="+mn-lt"/>
+        <a:ea typeface="+mn-ea"/>
+        <a:cs typeface="+mn-cs"/>
+      </a:defRPr>
+    </a:lvl9pPr>
+  </p:notesStyle>
+</p:notesMaster>
 </file>
 
 <file path=ppt/slideLayouts/slideLayout1.xml><?xml version="1.0" encoding="utf-8"?>
@@ -3354,8 +3708,8 @@
           </a:p>
         </p:txBody>
       </p:sp>
-      <mc:AlternateContent xmlns:mc="http://schemas.openxmlformats.org/markup-compatibility/2006">
-        <mc:Choice xmlns:a14="http://schemas.microsoft.com/office/drawing/2010/main" Requires="a14">
+      <mc:AlternateContent xmlns:mc="http://schemas.openxmlformats.org/markup-compatibility/2006" xmlns:a14="http://schemas.microsoft.com/office/drawing/2010/main">
+        <mc:Choice Requires="a14">
           <p:sp>
             <p:nvSpPr>
               <p:cNvPr id="3" name="Content Placeholder 2">
@@ -3884,7 +4238,7 @@
             </p:txBody>
           </p:sp>
         </mc:Choice>
-        <mc:Fallback>
+        <mc:Fallback xmlns="">
           <p:sp>
             <p:nvSpPr>
               <p:cNvPr id="3" name="Content Placeholder 2">
@@ -3982,8 +4336,8 @@
           </a:p>
         </p:txBody>
       </p:sp>
-      <mc:AlternateContent xmlns:mc="http://schemas.openxmlformats.org/markup-compatibility/2006">
-        <mc:Choice xmlns:a14="http://schemas.microsoft.com/office/drawing/2010/main" Requires="a14">
+      <mc:AlternateContent xmlns:mc="http://schemas.openxmlformats.org/markup-compatibility/2006" xmlns:a14="http://schemas.microsoft.com/office/drawing/2010/main">
+        <mc:Choice Requires="a14">
           <p:sp>
             <p:nvSpPr>
               <p:cNvPr id="3" name="Content Placeholder 2">
@@ -5337,7 +5691,7 @@
             </p:txBody>
           </p:sp>
         </mc:Choice>
-        <mc:Fallback>
+        <mc:Fallback xmlns="">
           <p:sp>
             <p:nvSpPr>
               <p:cNvPr id="3" name="Content Placeholder 2">
@@ -5435,8 +5789,8 @@
           </a:p>
         </p:txBody>
       </p:sp>
-      <mc:AlternateContent xmlns:mc="http://schemas.openxmlformats.org/markup-compatibility/2006">
-        <mc:Choice xmlns:a14="http://schemas.microsoft.com/office/drawing/2010/main" Requires="a14">
+      <mc:AlternateContent xmlns:mc="http://schemas.openxmlformats.org/markup-compatibility/2006" xmlns:a14="http://schemas.microsoft.com/office/drawing/2010/main">
+        <mc:Choice Requires="a14">
           <p:sp>
             <p:nvSpPr>
               <p:cNvPr id="3" name="Content Placeholder 2">
@@ -5740,7 +6094,7 @@
             </p:txBody>
           </p:sp>
         </mc:Choice>
-        <mc:Fallback>
+        <mc:Fallback xmlns="">
           <p:sp>
             <p:nvSpPr>
               <p:cNvPr id="3" name="Content Placeholder 2">
@@ -5838,8 +6192,8 @@
           </a:p>
         </p:txBody>
       </p:sp>
-      <mc:AlternateContent xmlns:mc="http://schemas.openxmlformats.org/markup-compatibility/2006">
-        <mc:Choice xmlns:a14="http://schemas.microsoft.com/office/drawing/2010/main" Requires="a14">
+      <mc:AlternateContent xmlns:mc="http://schemas.openxmlformats.org/markup-compatibility/2006" xmlns:a14="http://schemas.microsoft.com/office/drawing/2010/main">
+        <mc:Choice Requires="a14">
           <p:sp>
             <p:nvSpPr>
               <p:cNvPr id="3" name="Content Placeholder 2">
@@ -6648,7 +7002,7 @@
             </p:txBody>
           </p:sp>
         </mc:Choice>
-        <mc:Fallback>
+        <mc:Fallback xmlns="">
           <p:sp>
             <p:nvSpPr>
               <p:cNvPr id="3" name="Content Placeholder 2">
@@ -6692,6 +7046,389 @@
     <p:extLst>
       <p:ext uri="{BB962C8B-B14F-4D97-AF65-F5344CB8AC3E}">
         <p14:creationId xmlns:p14="http://schemas.microsoft.com/office/powerpoint/2010/main" val="3850085328"/>
+      </p:ext>
+    </p:extLst>
+  </p:cSld>
+  <p:clrMapOvr>
+    <a:masterClrMapping/>
+  </p:clrMapOvr>
+</p:sld>
+</file>
+
+<file path=ppt/slides/slide5.xml><?xml version="1.0" encoding="utf-8"?>
+<p:sld xmlns:a="http://schemas.openxmlformats.org/drawingml/2006/main" xmlns:r="http://schemas.openxmlformats.org/officeDocument/2006/relationships" xmlns:p="http://schemas.openxmlformats.org/presentationml/2006/main">
+  <p:cSld>
+    <p:spTree>
+      <p:nvGrpSpPr>
+        <p:cNvPr id="1" name=""/>
+        <p:cNvGrpSpPr/>
+        <p:nvPr/>
+      </p:nvGrpSpPr>
+      <p:grpSpPr>
+        <a:xfrm>
+          <a:off x="0" y="0"/>
+          <a:ext cx="0" cy="0"/>
+          <a:chOff x="0" y="0"/>
+          <a:chExt cx="0" cy="0"/>
+        </a:xfrm>
+      </p:grpSpPr>
+      <p:sp>
+        <p:nvSpPr>
+          <p:cNvPr id="2" name="Title 1">
+            <a:extLst>
+              <a:ext uri="{FF2B5EF4-FFF2-40B4-BE49-F238E27FC236}">
+                <a16:creationId xmlns:a16="http://schemas.microsoft.com/office/drawing/2014/main" id="{8BC36D0E-7883-42A2-A009-392310EA20DB}"/>
+              </a:ext>
+            </a:extLst>
+          </p:cNvPr>
+          <p:cNvSpPr>
+            <a:spLocks noGrp="1"/>
+          </p:cNvSpPr>
+          <p:nvPr>
+            <p:ph type="title"/>
+          </p:nvPr>
+        </p:nvSpPr>
+        <p:spPr>
+          <a:xfrm>
+            <a:off x="1097280" y="286603"/>
+            <a:ext cx="10058400" cy="1559952"/>
+          </a:xfrm>
+        </p:spPr>
+        <p:txBody>
+          <a:bodyPr>
+            <a:normAutofit/>
+          </a:bodyPr>
+          <a:lstStyle/>
+          <a:p>
+            <a:r>
+              <a:rPr lang="en-US" dirty="0"/>
+              <a:t>Advantages:</a:t>
+            </a:r>
+          </a:p>
+        </p:txBody>
+      </p:sp>
+      <p:sp>
+        <p:nvSpPr>
+          <p:cNvPr id="3" name="Content Placeholder 2">
+            <a:extLst>
+              <a:ext uri="{FF2B5EF4-FFF2-40B4-BE49-F238E27FC236}">
+                <a16:creationId xmlns:a16="http://schemas.microsoft.com/office/drawing/2014/main" id="{2B026EC1-4B87-451D-97A4-423134E26901}"/>
+              </a:ext>
+            </a:extLst>
+          </p:cNvPr>
+          <p:cNvSpPr>
+            <a:spLocks noGrp="1"/>
+          </p:cNvSpPr>
+          <p:nvPr>
+            <p:ph idx="1"/>
+          </p:nvPr>
+        </p:nvSpPr>
+        <p:spPr>
+          <a:xfrm>
+            <a:off x="1066800" y="1066579"/>
+            <a:ext cx="10058400" cy="4096851"/>
+          </a:xfrm>
+        </p:spPr>
+        <p:txBody>
+          <a:bodyPr/>
+          <a:lstStyle/>
+          <a:p>
+            <a:pPr marL="0" indent="0">
+              <a:buNone/>
+            </a:pPr>
+            <a:endParaRPr lang="en-US" dirty="0"/>
+          </a:p>
+          <a:p>
+            <a:endParaRPr lang="en-US" dirty="0"/>
+          </a:p>
+        </p:txBody>
+      </p:sp>
+      <p:sp>
+        <p:nvSpPr>
+          <p:cNvPr id="6" name="TextBox 5">
+            <a:extLst>
+              <a:ext uri="{FF2B5EF4-FFF2-40B4-BE49-F238E27FC236}">
+                <a16:creationId xmlns:a16="http://schemas.microsoft.com/office/drawing/2014/main" id="{FFA0AA14-0319-4955-B57D-27874D760052}"/>
+              </a:ext>
+            </a:extLst>
+          </p:cNvPr>
+          <p:cNvSpPr txBox="1"/>
+          <p:nvPr/>
+        </p:nvSpPr>
+        <p:spPr>
+          <a:xfrm>
+            <a:off x="1207363" y="2024109"/>
+            <a:ext cx="9948317" cy="3139321"/>
+          </a:xfrm>
+          <a:prstGeom prst="rect">
+            <a:avLst/>
+          </a:prstGeom>
+          <a:noFill/>
+        </p:spPr>
+        <p:txBody>
+          <a:bodyPr wrap="square" rtlCol="0">
+            <a:spAutoFit/>
+          </a:bodyPr>
+          <a:lstStyle/>
+          <a:p>
+            <a:pPr marL="342900" indent="-342900">
+              <a:buAutoNum type="arabicParenR"/>
+            </a:pPr>
+            <a:r>
+              <a:rPr lang="en-US" dirty="0"/>
+              <a:t>Simple to implement</a:t>
+            </a:r>
+          </a:p>
+          <a:p>
+            <a:pPr marL="342900" indent="-342900">
+              <a:buAutoNum type="arabicParenR"/>
+            </a:pPr>
+            <a:endParaRPr lang="en-US" dirty="0"/>
+          </a:p>
+          <a:p>
+            <a:pPr marL="342900" indent="-342900">
+              <a:buAutoNum type="arabicParenR"/>
+            </a:pPr>
+            <a:r>
+              <a:rPr lang="en-US" dirty="0"/>
+              <a:t>Fast and effective in predicting the class of datasets</a:t>
+            </a:r>
+          </a:p>
+          <a:p>
+            <a:pPr marL="342900" indent="-342900">
+              <a:buAutoNum type="arabicParenR"/>
+            </a:pPr>
+            <a:endParaRPr lang="en-US" dirty="0"/>
+          </a:p>
+          <a:p>
+            <a:pPr marL="342900" indent="-342900">
+              <a:buAutoNum type="arabicParenR"/>
+            </a:pPr>
+            <a:r>
+              <a:rPr lang="en-US" dirty="0"/>
+              <a:t>Doesn’t require a large test set to work well</a:t>
+            </a:r>
+          </a:p>
+          <a:p>
+            <a:pPr marL="342900" indent="-342900">
+              <a:buAutoNum type="arabicParenR"/>
+            </a:pPr>
+            <a:endParaRPr lang="en-US" dirty="0"/>
+          </a:p>
+          <a:p>
+            <a:pPr marL="342900" indent="-342900">
+              <a:buAutoNum type="arabicParenR"/>
+            </a:pPr>
+            <a:r>
+              <a:rPr lang="en-US" dirty="0"/>
+              <a:t>Can handle both discrete and continuous data</a:t>
+            </a:r>
+          </a:p>
+          <a:p>
+            <a:pPr marL="342900" indent="-342900">
+              <a:buAutoNum type="arabicParenR"/>
+            </a:pPr>
+            <a:endParaRPr lang="en-US" dirty="0"/>
+          </a:p>
+          <a:p>
+            <a:pPr marL="342900" indent="-342900">
+              <a:buAutoNum type="arabicParenR"/>
+            </a:pPr>
+            <a:r>
+              <a:rPr lang="en-US" dirty="0"/>
+              <a:t>Useful for text analysis and classification problems</a:t>
+            </a:r>
+          </a:p>
+          <a:p>
+            <a:pPr marL="342900" indent="-342900">
+              <a:buAutoNum type="arabicParenR"/>
+            </a:pPr>
+            <a:endParaRPr lang="en-US" dirty="0"/>
+          </a:p>
+          <a:p>
+            <a:pPr marL="342900" indent="-342900">
+              <a:buAutoNum type="arabicParenR"/>
+            </a:pPr>
+            <a:r>
+              <a:rPr lang="en-US" dirty="0"/>
+              <a:t>Can be used for multiple class prediction problems</a:t>
+            </a:r>
+          </a:p>
+        </p:txBody>
+      </p:sp>
+    </p:spTree>
+    <p:extLst>
+      <p:ext uri="{BB962C8B-B14F-4D97-AF65-F5344CB8AC3E}">
+        <p14:creationId xmlns:p14="http://schemas.microsoft.com/office/powerpoint/2010/main" val="2202894520"/>
+      </p:ext>
+    </p:extLst>
+  </p:cSld>
+  <p:clrMapOvr>
+    <a:masterClrMapping/>
+  </p:clrMapOvr>
+</p:sld>
+</file>
+
+<file path=ppt/slides/slide6.xml><?xml version="1.0" encoding="utf-8"?>
+<p:sld xmlns:a="http://schemas.openxmlformats.org/drawingml/2006/main" xmlns:r="http://schemas.openxmlformats.org/officeDocument/2006/relationships" xmlns:p="http://schemas.openxmlformats.org/presentationml/2006/main">
+  <p:cSld>
+    <p:spTree>
+      <p:nvGrpSpPr>
+        <p:cNvPr id="1" name=""/>
+        <p:cNvGrpSpPr/>
+        <p:nvPr/>
+      </p:nvGrpSpPr>
+      <p:grpSpPr>
+        <a:xfrm>
+          <a:off x="0" y="0"/>
+          <a:ext cx="0" cy="0"/>
+          <a:chOff x="0" y="0"/>
+          <a:chExt cx="0" cy="0"/>
+        </a:xfrm>
+      </p:grpSpPr>
+      <p:sp>
+        <p:nvSpPr>
+          <p:cNvPr id="2" name="Title 1">
+            <a:extLst>
+              <a:ext uri="{FF2B5EF4-FFF2-40B4-BE49-F238E27FC236}">
+                <a16:creationId xmlns:a16="http://schemas.microsoft.com/office/drawing/2014/main" id="{8BC36D0E-7883-42A2-A009-392310EA20DB}"/>
+              </a:ext>
+            </a:extLst>
+          </p:cNvPr>
+          <p:cNvSpPr>
+            <a:spLocks noGrp="1"/>
+          </p:cNvSpPr>
+          <p:nvPr>
+            <p:ph type="title"/>
+          </p:nvPr>
+        </p:nvSpPr>
+        <p:spPr>
+          <a:xfrm>
+            <a:off x="1097280" y="286603"/>
+            <a:ext cx="10058400" cy="1559952"/>
+          </a:xfrm>
+        </p:spPr>
+        <p:txBody>
+          <a:bodyPr>
+            <a:normAutofit/>
+          </a:bodyPr>
+          <a:lstStyle/>
+          <a:p>
+            <a:r>
+              <a:rPr lang="en-US" dirty="0"/>
+              <a:t>Disadvantages:</a:t>
+            </a:r>
+          </a:p>
+        </p:txBody>
+      </p:sp>
+      <p:sp>
+        <p:nvSpPr>
+          <p:cNvPr id="3" name="Content Placeholder 2">
+            <a:extLst>
+              <a:ext uri="{FF2B5EF4-FFF2-40B4-BE49-F238E27FC236}">
+                <a16:creationId xmlns:a16="http://schemas.microsoft.com/office/drawing/2014/main" id="{2B026EC1-4B87-451D-97A4-423134E26901}"/>
+              </a:ext>
+            </a:extLst>
+          </p:cNvPr>
+          <p:cNvSpPr>
+            <a:spLocks noGrp="1"/>
+          </p:cNvSpPr>
+          <p:nvPr>
+            <p:ph idx="1"/>
+          </p:nvPr>
+        </p:nvSpPr>
+        <p:spPr>
+          <a:xfrm>
+            <a:off x="1066800" y="1066579"/>
+            <a:ext cx="10058400" cy="4096851"/>
+          </a:xfrm>
+        </p:spPr>
+        <p:txBody>
+          <a:bodyPr/>
+          <a:lstStyle/>
+          <a:p>
+            <a:pPr marL="0" indent="0">
+              <a:buNone/>
+            </a:pPr>
+            <a:endParaRPr lang="en-US" dirty="0"/>
+          </a:p>
+          <a:p>
+            <a:endParaRPr lang="en-US" dirty="0"/>
+          </a:p>
+        </p:txBody>
+      </p:sp>
+      <p:sp>
+        <p:nvSpPr>
+          <p:cNvPr id="6" name="TextBox 5">
+            <a:extLst>
+              <a:ext uri="{FF2B5EF4-FFF2-40B4-BE49-F238E27FC236}">
+                <a16:creationId xmlns:a16="http://schemas.microsoft.com/office/drawing/2014/main" id="{FFA0AA14-0319-4955-B57D-27874D760052}"/>
+              </a:ext>
+            </a:extLst>
+          </p:cNvPr>
+          <p:cNvSpPr txBox="1"/>
+          <p:nvPr/>
+        </p:nvSpPr>
+        <p:spPr>
+          <a:xfrm>
+            <a:off x="1207363" y="2024109"/>
+            <a:ext cx="9948317" cy="1477328"/>
+          </a:xfrm>
+          <a:prstGeom prst="rect">
+            <a:avLst/>
+          </a:prstGeom>
+          <a:noFill/>
+        </p:spPr>
+        <p:txBody>
+          <a:bodyPr wrap="square" rtlCol="0">
+            <a:spAutoFit/>
+          </a:bodyPr>
+          <a:lstStyle/>
+          <a:p>
+            <a:pPr marL="342900" indent="-342900">
+              <a:buAutoNum type="arabicParenR"/>
+            </a:pPr>
+            <a:r>
+              <a:rPr lang="en-US" dirty="0"/>
+              <a:t>Relies upon the assumption that variables are independent</a:t>
+            </a:r>
+          </a:p>
+          <a:p>
+            <a:pPr marL="342900" indent="-342900">
+              <a:buAutoNum type="arabicParenR"/>
+            </a:pPr>
+            <a:endParaRPr lang="en-US" dirty="0"/>
+          </a:p>
+          <a:p>
+            <a:pPr marL="342900" indent="-342900">
+              <a:buAutoNum type="arabicParenR"/>
+            </a:pPr>
+            <a:r>
+              <a:rPr lang="en-US" dirty="0"/>
+              <a:t>Not ideal for data sets with a large number of variables</a:t>
+            </a:r>
+          </a:p>
+          <a:p>
+            <a:pPr marL="342900" indent="-342900">
+              <a:buAutoNum type="arabicParenR"/>
+            </a:pPr>
+            <a:endParaRPr lang="en-US" dirty="0"/>
+          </a:p>
+          <a:p>
+            <a:pPr marL="342900" indent="-342900">
+              <a:buAutoNum type="arabicParenR"/>
+            </a:pPr>
+            <a:r>
+              <a:rPr lang="en-US" dirty="0"/>
+              <a:t>Zero Frequency Problem</a:t>
+            </a:r>
+          </a:p>
+        </p:txBody>
+      </p:sp>
+    </p:spTree>
+    <p:extLst>
+      <p:ext uri="{BB962C8B-B14F-4D97-AF65-F5344CB8AC3E}">
+        <p14:creationId xmlns:p14="http://schemas.microsoft.com/office/powerpoint/2010/main" val="385318783"/>
       </p:ext>
     </p:extLst>
   </p:cSld>
@@ -6984,25 +7721,302 @@
 </a:theme>
 </file>
 
-<file path=customXml/item1.xml><?xml version="1.0" encoding="utf-8"?>
-<p:properties xmlns:p="http://schemas.microsoft.com/office/2006/metadata/properties" xmlns:xsi="http://www.w3.org/2001/XMLSchema-instance" xmlns:pc="http://schemas.microsoft.com/office/infopath/2007/PartnerControls">
-  <documentManagement>
-    <Status xmlns="71af3243-3dd4-4a8d-8c0d-dd76da1f02a5">Not started</Status>
-    <MediaServiceKeyPoints xmlns="71af3243-3dd4-4a8d-8c0d-dd76da1f02a5" xsi:nil="true"/>
-  </documentManagement>
-</p:properties>
+<file path=ppt/theme/theme2.xml><?xml version="1.0" encoding="utf-8"?>
+<a:theme xmlns:a="http://schemas.openxmlformats.org/drawingml/2006/main" name="Office Theme">
+  <a:themeElements>
+    <a:clrScheme name="Office">
+      <a:dk1>
+        <a:sysClr val="windowText" lastClr="000000"/>
+      </a:dk1>
+      <a:lt1>
+        <a:sysClr val="window" lastClr="FFFFFF"/>
+      </a:lt1>
+      <a:dk2>
+        <a:srgbClr val="44546A"/>
+      </a:dk2>
+      <a:lt2>
+        <a:srgbClr val="E7E6E6"/>
+      </a:lt2>
+      <a:accent1>
+        <a:srgbClr val="4472C4"/>
+      </a:accent1>
+      <a:accent2>
+        <a:srgbClr val="ED7D31"/>
+      </a:accent2>
+      <a:accent3>
+        <a:srgbClr val="A5A5A5"/>
+      </a:accent3>
+      <a:accent4>
+        <a:srgbClr val="FFC000"/>
+      </a:accent4>
+      <a:accent5>
+        <a:srgbClr val="5B9BD5"/>
+      </a:accent5>
+      <a:accent6>
+        <a:srgbClr val="70AD47"/>
+      </a:accent6>
+      <a:hlink>
+        <a:srgbClr val="0563C1"/>
+      </a:hlink>
+      <a:folHlink>
+        <a:srgbClr val="954F72"/>
+      </a:folHlink>
+    </a:clrScheme>
+    <a:fontScheme name="Office">
+      <a:majorFont>
+        <a:latin typeface="Calibri Light" panose="020F0302020204030204"/>
+        <a:ea typeface=""/>
+        <a:cs typeface=""/>
+        <a:font script="Jpan" typeface="游ゴシック Light"/>
+        <a:font script="Hang" typeface="맑은 고딕"/>
+        <a:font script="Hans" typeface="等线 Light"/>
+        <a:font script="Hant" typeface="新細明體"/>
+        <a:font script="Arab" typeface="Times New Roman"/>
+        <a:font script="Hebr" typeface="Times New Roman"/>
+        <a:font script="Thai" typeface="Angsana New"/>
+        <a:font script="Ethi" typeface="Nyala"/>
+        <a:font script="Beng" typeface="Vrinda"/>
+        <a:font script="Gujr" typeface="Shruti"/>
+        <a:font script="Khmr" typeface="MoolBoran"/>
+        <a:font script="Knda" typeface="Tunga"/>
+        <a:font script="Guru" typeface="Raavi"/>
+        <a:font script="Cans" typeface="Euphemia"/>
+        <a:font script="Cher" typeface="Plantagenet Cherokee"/>
+        <a:font script="Yiii" typeface="Microsoft Yi Baiti"/>
+        <a:font script="Tibt" typeface="Microsoft Himalaya"/>
+        <a:font script="Thaa" typeface="MV Boli"/>
+        <a:font script="Deva" typeface="Mangal"/>
+        <a:font script="Telu" typeface="Gautami"/>
+        <a:font script="Taml" typeface="Latha"/>
+        <a:font script="Syrc" typeface="Estrangelo Edessa"/>
+        <a:font script="Orya" typeface="Kalinga"/>
+        <a:font script="Mlym" typeface="Kartika"/>
+        <a:font script="Laoo" typeface="DokChampa"/>
+        <a:font script="Sinh" typeface="Iskoola Pota"/>
+        <a:font script="Mong" typeface="Mongolian Baiti"/>
+        <a:font script="Viet" typeface="Times New Roman"/>
+        <a:font script="Uigh" typeface="Microsoft Uighur"/>
+        <a:font script="Geor" typeface="Sylfaen"/>
+        <a:font script="Armn" typeface="Arial"/>
+        <a:font script="Bugi" typeface="Leelawadee UI"/>
+        <a:font script="Bopo" typeface="Microsoft JhengHei"/>
+        <a:font script="Java" typeface="Javanese Text"/>
+        <a:font script="Lisu" typeface="Segoe UI"/>
+        <a:font script="Mymr" typeface="Myanmar Text"/>
+        <a:font script="Nkoo" typeface="Ebrima"/>
+        <a:font script="Olck" typeface="Nirmala UI"/>
+        <a:font script="Osma" typeface="Ebrima"/>
+        <a:font script="Phag" typeface="Phagspa"/>
+        <a:font script="Syrn" typeface="Estrangelo Edessa"/>
+        <a:font script="Syrj" typeface="Estrangelo Edessa"/>
+        <a:font script="Syre" typeface="Estrangelo Edessa"/>
+        <a:font script="Sora" typeface="Nirmala UI"/>
+        <a:font script="Tale" typeface="Microsoft Tai Le"/>
+        <a:font script="Talu" typeface="Microsoft New Tai Lue"/>
+        <a:font script="Tfng" typeface="Ebrima"/>
+      </a:majorFont>
+      <a:minorFont>
+        <a:latin typeface="Calibri" panose="020F0502020204030204"/>
+        <a:ea typeface=""/>
+        <a:cs typeface=""/>
+        <a:font script="Jpan" typeface="游ゴシック"/>
+        <a:font script="Hang" typeface="맑은 고딕"/>
+        <a:font script="Hans" typeface="等线"/>
+        <a:font script="Hant" typeface="新細明體"/>
+        <a:font script="Arab" typeface="Arial"/>
+        <a:font script="Hebr" typeface="Arial"/>
+        <a:font script="Thai" typeface="Cordia New"/>
+        <a:font script="Ethi" typeface="Nyala"/>
+        <a:font script="Beng" typeface="Vrinda"/>
+        <a:font script="Gujr" typeface="Shruti"/>
+        <a:font script="Khmr" typeface="DaunPenh"/>
+        <a:font script="Knda" typeface="Tunga"/>
+        <a:font script="Guru" typeface="Raavi"/>
+        <a:font script="Cans" typeface="Euphemia"/>
+        <a:font script="Cher" typeface="Plantagenet Cherokee"/>
+        <a:font script="Yiii" typeface="Microsoft Yi Baiti"/>
+        <a:font script="Tibt" typeface="Microsoft Himalaya"/>
+        <a:font script="Thaa" typeface="MV Boli"/>
+        <a:font script="Deva" typeface="Mangal"/>
+        <a:font script="Telu" typeface="Gautami"/>
+        <a:font script="Taml" typeface="Latha"/>
+        <a:font script="Syrc" typeface="Estrangelo Edessa"/>
+        <a:font script="Orya" typeface="Kalinga"/>
+        <a:font script="Mlym" typeface="Kartika"/>
+        <a:font script="Laoo" typeface="DokChampa"/>
+        <a:font script="Sinh" typeface="Iskoola Pota"/>
+        <a:font script="Mong" typeface="Mongolian Baiti"/>
+        <a:font script="Viet" typeface="Arial"/>
+        <a:font script="Uigh" typeface="Microsoft Uighur"/>
+        <a:font script="Geor" typeface="Sylfaen"/>
+        <a:font script="Armn" typeface="Arial"/>
+        <a:font script="Bugi" typeface="Leelawadee UI"/>
+        <a:font script="Bopo" typeface="Microsoft JhengHei"/>
+        <a:font script="Java" typeface="Javanese Text"/>
+        <a:font script="Lisu" typeface="Segoe UI"/>
+        <a:font script="Mymr" typeface="Myanmar Text"/>
+        <a:font script="Nkoo" typeface="Ebrima"/>
+        <a:font script="Olck" typeface="Nirmala UI"/>
+        <a:font script="Osma" typeface="Ebrima"/>
+        <a:font script="Phag" typeface="Phagspa"/>
+        <a:font script="Syrn" typeface="Estrangelo Edessa"/>
+        <a:font script="Syrj" typeface="Estrangelo Edessa"/>
+        <a:font script="Syre" typeface="Estrangelo Edessa"/>
+        <a:font script="Sora" typeface="Nirmala UI"/>
+        <a:font script="Tale" typeface="Microsoft Tai Le"/>
+        <a:font script="Talu" typeface="Microsoft New Tai Lue"/>
+        <a:font script="Tfng" typeface="Ebrima"/>
+      </a:minorFont>
+    </a:fontScheme>
+    <a:fmtScheme name="Office">
+      <a:fillStyleLst>
+        <a:solidFill>
+          <a:schemeClr val="phClr"/>
+        </a:solidFill>
+        <a:gradFill rotWithShape="1">
+          <a:gsLst>
+            <a:gs pos="0">
+              <a:schemeClr val="phClr">
+                <a:lumMod val="110000"/>
+                <a:satMod val="105000"/>
+                <a:tint val="67000"/>
+              </a:schemeClr>
+            </a:gs>
+            <a:gs pos="50000">
+              <a:schemeClr val="phClr">
+                <a:lumMod val="105000"/>
+                <a:satMod val="103000"/>
+                <a:tint val="73000"/>
+              </a:schemeClr>
+            </a:gs>
+            <a:gs pos="100000">
+              <a:schemeClr val="phClr">
+                <a:lumMod val="105000"/>
+                <a:satMod val="109000"/>
+                <a:tint val="81000"/>
+              </a:schemeClr>
+            </a:gs>
+          </a:gsLst>
+          <a:lin ang="5400000" scaled="0"/>
+        </a:gradFill>
+        <a:gradFill rotWithShape="1">
+          <a:gsLst>
+            <a:gs pos="0">
+              <a:schemeClr val="phClr">
+                <a:satMod val="103000"/>
+                <a:lumMod val="102000"/>
+                <a:tint val="94000"/>
+              </a:schemeClr>
+            </a:gs>
+            <a:gs pos="50000">
+              <a:schemeClr val="phClr">
+                <a:satMod val="110000"/>
+                <a:lumMod val="100000"/>
+                <a:shade val="100000"/>
+              </a:schemeClr>
+            </a:gs>
+            <a:gs pos="100000">
+              <a:schemeClr val="phClr">
+                <a:lumMod val="99000"/>
+                <a:satMod val="120000"/>
+                <a:shade val="78000"/>
+              </a:schemeClr>
+            </a:gs>
+          </a:gsLst>
+          <a:lin ang="5400000" scaled="0"/>
+        </a:gradFill>
+      </a:fillStyleLst>
+      <a:lnStyleLst>
+        <a:ln w="6350" cap="flat" cmpd="sng" algn="ctr">
+          <a:solidFill>
+            <a:schemeClr val="phClr"/>
+          </a:solidFill>
+          <a:prstDash val="solid"/>
+          <a:miter lim="800000"/>
+        </a:ln>
+        <a:ln w="12700" cap="flat" cmpd="sng" algn="ctr">
+          <a:solidFill>
+            <a:schemeClr val="phClr"/>
+          </a:solidFill>
+          <a:prstDash val="solid"/>
+          <a:miter lim="800000"/>
+        </a:ln>
+        <a:ln w="19050" cap="flat" cmpd="sng" algn="ctr">
+          <a:solidFill>
+            <a:schemeClr val="phClr"/>
+          </a:solidFill>
+          <a:prstDash val="solid"/>
+          <a:miter lim="800000"/>
+        </a:ln>
+      </a:lnStyleLst>
+      <a:effectStyleLst>
+        <a:effectStyle>
+          <a:effectLst/>
+        </a:effectStyle>
+        <a:effectStyle>
+          <a:effectLst/>
+        </a:effectStyle>
+        <a:effectStyle>
+          <a:effectLst>
+            <a:outerShdw blurRad="57150" dist="19050" dir="5400000" algn="ctr" rotWithShape="0">
+              <a:srgbClr val="000000">
+                <a:alpha val="63000"/>
+              </a:srgbClr>
+            </a:outerShdw>
+          </a:effectLst>
+        </a:effectStyle>
+      </a:effectStyleLst>
+      <a:bgFillStyleLst>
+        <a:solidFill>
+          <a:schemeClr val="phClr"/>
+        </a:solidFill>
+        <a:solidFill>
+          <a:schemeClr val="phClr">
+            <a:tint val="95000"/>
+            <a:satMod val="170000"/>
+          </a:schemeClr>
+        </a:solidFill>
+        <a:gradFill rotWithShape="1">
+          <a:gsLst>
+            <a:gs pos="0">
+              <a:schemeClr val="phClr">
+                <a:tint val="93000"/>
+                <a:satMod val="150000"/>
+                <a:shade val="98000"/>
+                <a:lumMod val="102000"/>
+              </a:schemeClr>
+            </a:gs>
+            <a:gs pos="50000">
+              <a:schemeClr val="phClr">
+                <a:tint val="98000"/>
+                <a:satMod val="130000"/>
+                <a:shade val="90000"/>
+                <a:lumMod val="103000"/>
+              </a:schemeClr>
+            </a:gs>
+            <a:gs pos="100000">
+              <a:schemeClr val="phClr">
+                <a:shade val="63000"/>
+                <a:satMod val="120000"/>
+              </a:schemeClr>
+            </a:gs>
+          </a:gsLst>
+          <a:lin ang="5400000" scaled="0"/>
+        </a:gradFill>
+      </a:bgFillStyleLst>
+    </a:fmtScheme>
+  </a:themeElements>
+  <a:objectDefaults/>
+  <a:extraClrSchemeLst/>
+  <a:extLst>
+    <a:ext uri="{05A4C25C-085E-4340-85A3-A5531E510DB2}">
+      <thm15:themeFamily xmlns:thm15="http://schemas.microsoft.com/office/thememl/2012/main" name="Office Theme" id="{62F939B6-93AF-4DB8-9C6B-D6C7DFDC589F}" vid="{4A3C46E8-61CC-4603-A589-7422A47A8E4A}"/>
+    </a:ext>
+  </a:extLst>
+</a:theme>
 </file>
 
-<file path=customXml/item2.xml><?xml version="1.0" encoding="utf-8"?>
-<?mso-contentType ?>
-<FormTemplates xmlns="http://schemas.microsoft.com/sharepoint/v3/contenttype/forms">
-  <Display>DocumentLibraryForm</Display>
-  <Edit>DocumentLibraryForm</Edit>
-  <New>DocumentLibraryForm</New>
-</FormTemplates>
-</file>
-
-<file path=customXml/item3.xml><?xml version="1.0" encoding="utf-8"?>
+<file path=customXml/item1.xml><?xml version="1.0" encoding="utf-8"?>
 <ct:contentTypeSchema xmlns:ct="http://schemas.microsoft.com/office/2006/metadata/contentType" xmlns:ma="http://schemas.microsoft.com/office/2006/metadata/properties/metaAttributes" ct:_="" ma:_="" ma:contentTypeName="Document" ma:contentTypeID="0x01010079F111ED35F8CC479449609E8A0923A6" ma:contentTypeVersion="12" ma:contentTypeDescription="Create a new document." ma:contentTypeScope="" ma:versionID="a410dd7f93c95333ffa1b60ed6adedd1">
   <xsd:schema xmlns:xsd="http://www.w3.org/2001/XMLSchema" xmlns:xs="http://www.w3.org/2001/XMLSchema" xmlns:p="http://schemas.microsoft.com/office/2006/metadata/properties" xmlns:ns2="71af3243-3dd4-4a8d-8c0d-dd76da1f02a5" xmlns:ns3="16c05727-aa75-4e4a-9b5f-8a80a1165891" targetNamespace="http://schemas.microsoft.com/office/2006/metadata/properties" ma:root="true" ma:fieldsID="a936d9baba76aa3866493feff160faab" ns2:_="" ns3:_="">
     <xsd:import namespace="71af3243-3dd4-4a8d-8c0d-dd76da1f02a5"/>
@@ -7223,25 +8237,25 @@
 </ct:contentTypeSchema>
 </file>
 
-<file path=customXml/itemProps1.xml><?xml version="1.0" encoding="utf-8"?>
-<ds:datastoreItem xmlns:ds="http://schemas.openxmlformats.org/officeDocument/2006/customXml" ds:itemID="{A03EEFF0-FB57-4CB4-8BFC-DF397689E2ED}">
-  <ds:schemaRefs>
-    <ds:schemaRef ds:uri="http://schemas.microsoft.com/office/2006/metadata/properties"/>
-    <ds:schemaRef ds:uri="http://schemas.microsoft.com/office/infopath/2007/PartnerControls"/>
-    <ds:schemaRef ds:uri="71af3243-3dd4-4a8d-8c0d-dd76da1f02a5"/>
-  </ds:schemaRefs>
-</ds:datastoreItem>
+<file path=customXml/item2.xml><?xml version="1.0" encoding="utf-8"?>
+<?mso-contentType ?>
+<FormTemplates xmlns="http://schemas.microsoft.com/sharepoint/v3/contenttype/forms">
+  <Display>DocumentLibraryForm</Display>
+  <Edit>DocumentLibraryForm</Edit>
+  <New>DocumentLibraryForm</New>
+</FormTemplates>
 </file>
 
-<file path=customXml/itemProps2.xml><?xml version="1.0" encoding="utf-8"?>
-<ds:datastoreItem xmlns:ds="http://schemas.openxmlformats.org/officeDocument/2006/customXml" ds:itemID="{AA3F7EDC-E5B4-4BBC-9D2A-CBE6D46C37AD}">
-  <ds:schemaRefs>
-    <ds:schemaRef ds:uri="http://schemas.microsoft.com/sharepoint/v3/contenttype/forms"/>
-  </ds:schemaRefs>
-</ds:datastoreItem>
+<file path=customXml/item3.xml><?xml version="1.0" encoding="utf-8"?>
+<p:properties xmlns:p="http://schemas.microsoft.com/office/2006/metadata/properties" xmlns:xsi="http://www.w3.org/2001/XMLSchema-instance" xmlns:pc="http://schemas.microsoft.com/office/infopath/2007/PartnerControls">
+  <documentManagement>
+    <Status xmlns="71af3243-3dd4-4a8d-8c0d-dd76da1f02a5">Not started</Status>
+    <MediaServiceKeyPoints xmlns="71af3243-3dd4-4a8d-8c0d-dd76da1f02a5" xsi:nil="true"/>
+  </documentManagement>
+</p:properties>
 </file>
 
-<file path=customXml/itemProps3.xml><?xml version="1.0" encoding="utf-8"?>
+<file path=customXml/itemProps1.xml><?xml version="1.0" encoding="utf-8"?>
 <ds:datastoreItem xmlns:ds="http://schemas.openxmlformats.org/officeDocument/2006/customXml" ds:itemID="{93932EF5-314F-409E-8020-FEE5FA0795B9}">
   <ds:schemaRefs>
     <ds:schemaRef ds:uri="http://schemas.microsoft.com/office/2006/metadata/contentType"/>
@@ -7258,4 +8272,22 @@
     <ds:schemaRef ds:uri="http://schemas.microsoft.com/internal/obd"/>
   </ds:schemaRefs>
 </ds:datastoreItem>
+</file>
+
+<file path=customXml/itemProps2.xml><?xml version="1.0" encoding="utf-8"?>
+<ds:datastoreItem xmlns:ds="http://schemas.openxmlformats.org/officeDocument/2006/customXml" ds:itemID="{AA3F7EDC-E5B4-4BBC-9D2A-CBE6D46C37AD}">
+  <ds:schemaRefs>
+    <ds:schemaRef ds:uri="http://schemas.microsoft.com/sharepoint/v3/contenttype/forms"/>
+  </ds:schemaRefs>
+</ds:datastoreItem>
+</file>
+
+<file path=customXml/itemProps3.xml><?xml version="1.0" encoding="utf-8"?>
+<ds:datastoreItem xmlns:ds="http://schemas.openxmlformats.org/officeDocument/2006/customXml" ds:itemID="{A03EEFF0-FB57-4CB4-8BFC-DF397689E2ED}">
+  <ds:schemaRefs>
+    <ds:schemaRef ds:uri="http://schemas.microsoft.com/office/2006/metadata/properties"/>
+    <ds:schemaRef ds:uri="http://schemas.microsoft.com/office/infopath/2007/PartnerControls"/>
+    <ds:schemaRef ds:uri="71af3243-3dd4-4a8d-8c0d-dd76da1f02a5"/>
+  </ds:schemaRefs>
+</ds:datastoreItem>
 </file>
</xml_diff>

<commit_message>
Adding Data Proccesing Slide
</commit_message>
<xml_diff>
--- a/Naive Bayes Notes.pptx
+++ b/Naive Bayes Notes.pptx
@@ -5,7 +5,7 @@
     <p:sldMasterId id="2147483660" r:id="rId4"/>
   </p:sldMasterIdLst>
   <p:notesMasterIdLst>
-    <p:notesMasterId r:id="rId11"/>
+    <p:notesMasterId r:id="rId12"/>
   </p:notesMasterIdLst>
   <p:sldIdLst>
     <p:sldId id="301" r:id="rId5"/>
@@ -13,7 +13,8 @@
     <p:sldId id="303" r:id="rId7"/>
     <p:sldId id="306" r:id="rId8"/>
     <p:sldId id="307" r:id="rId9"/>
-    <p:sldId id="308" r:id="rId10"/>
+    <p:sldId id="309" r:id="rId10"/>
+    <p:sldId id="308" r:id="rId11"/>
   </p:sldIdLst>
   <p:sldSz cx="12192000" cy="6858000"/>
   <p:notesSz cx="6858000" cy="9144000"/>
@@ -6531,6 +6532,261 @@
 </file>
 
 <file path=ppt/slides/slide6.xml><?xml version="1.0" encoding="utf-8"?>
+<p:sld xmlns:a="http://schemas.openxmlformats.org/drawingml/2006/main" xmlns:r="http://schemas.openxmlformats.org/officeDocument/2006/relationships" xmlns:p="http://schemas.openxmlformats.org/presentationml/2006/main">
+  <p:cSld>
+    <p:spTree>
+      <p:nvGrpSpPr>
+        <p:cNvPr id="1" name=""/>
+        <p:cNvGrpSpPr/>
+        <p:nvPr/>
+      </p:nvGrpSpPr>
+      <p:grpSpPr>
+        <a:xfrm>
+          <a:off x="0" y="0"/>
+          <a:ext cx="0" cy="0"/>
+          <a:chOff x="0" y="0"/>
+          <a:chExt cx="0" cy="0"/>
+        </a:xfrm>
+      </p:grpSpPr>
+      <p:sp>
+        <p:nvSpPr>
+          <p:cNvPr id="2" name="Title 1">
+            <a:extLst>
+              <a:ext uri="{FF2B5EF4-FFF2-40B4-BE49-F238E27FC236}">
+                <a16:creationId xmlns:a16="http://schemas.microsoft.com/office/drawing/2014/main" id="{E7485BA7-58F2-4901-BFB9-464E48EECCED}"/>
+              </a:ext>
+            </a:extLst>
+          </p:cNvPr>
+          <p:cNvSpPr>
+            <a:spLocks noGrp="1"/>
+          </p:cNvSpPr>
+          <p:nvPr>
+            <p:ph type="title"/>
+          </p:nvPr>
+        </p:nvSpPr>
+        <p:spPr/>
+        <p:txBody>
+          <a:bodyPr>
+            <a:normAutofit/>
+          </a:bodyPr>
+          <a:lstStyle/>
+          <a:p>
+            <a:pPr algn="ctr"/>
+            <a:r>
+              <a:rPr lang="en-US" sz="4000" b="0" i="0" dirty="0">
+                <a:solidFill>
+                  <a:srgbClr val="212529"/>
+                </a:solidFill>
+                <a:effectLst/>
+                <a:latin typeface="Helvetica" panose="020B0604020202020204" pitchFamily="34" charset="0"/>
+              </a:rPr>
+              <a:t>What data processing steps does the algorithm require</a:t>
+            </a:r>
+            <a:endParaRPr lang="en-US" sz="4000" dirty="0"/>
+          </a:p>
+        </p:txBody>
+      </p:sp>
+      <p:sp>
+        <p:nvSpPr>
+          <p:cNvPr id="4" name="TextBox 3">
+            <a:extLst>
+              <a:ext uri="{FF2B5EF4-FFF2-40B4-BE49-F238E27FC236}">
+                <a16:creationId xmlns:a16="http://schemas.microsoft.com/office/drawing/2014/main" id="{8638AF3E-BD24-47FD-86D0-31FB375D195C}"/>
+              </a:ext>
+            </a:extLst>
+          </p:cNvPr>
+          <p:cNvSpPr txBox="1"/>
+          <p:nvPr/>
+        </p:nvSpPr>
+        <p:spPr>
+          <a:xfrm>
+            <a:off x="1297857" y="2295728"/>
+            <a:ext cx="9783098" cy="3785652"/>
+          </a:xfrm>
+          <a:prstGeom prst="rect">
+            <a:avLst/>
+          </a:prstGeom>
+          <a:noFill/>
+        </p:spPr>
+        <p:txBody>
+          <a:bodyPr wrap="square" rtlCol="0">
+            <a:spAutoFit/>
+          </a:bodyPr>
+          <a:lstStyle/>
+          <a:p>
+            <a:pPr marL="285750" indent="-285750">
+              <a:buFont typeface="Wingdings" panose="05000000000000000000" pitchFamily="2" charset="2"/>
+              <a:buChar char="§"/>
+            </a:pPr>
+            <a:r>
+              <a:rPr lang="en-US" sz="2000" b="1" i="0" u="none" strike="noStrike" dirty="0">
+                <a:solidFill>
+                  <a:srgbClr val="212529"/>
+                </a:solidFill>
+                <a:effectLst/>
+                <a:latin typeface="Arial" panose="020B0604020202020204" pitchFamily="34" charset="0"/>
+              </a:rPr>
+              <a:t>Convert categorical features to numeric (get dummies)</a:t>
+            </a:r>
+          </a:p>
+          <a:p>
+            <a:pPr marL="285750" indent="-285750">
+              <a:buFont typeface="Wingdings" panose="05000000000000000000" pitchFamily="2" charset="2"/>
+              <a:buChar char="§"/>
+            </a:pPr>
+            <a:endParaRPr lang="en-US" sz="2000" b="1" i="0" u="none" strike="noStrike" dirty="0">
+              <a:solidFill>
+                <a:srgbClr val="212529"/>
+              </a:solidFill>
+              <a:effectLst/>
+              <a:latin typeface="Arial" panose="020B0604020202020204" pitchFamily="34" charset="0"/>
+            </a:endParaRPr>
+          </a:p>
+          <a:p>
+            <a:pPr marL="285750" indent="-285750">
+              <a:buFont typeface="Wingdings" panose="05000000000000000000" pitchFamily="2" charset="2"/>
+              <a:buChar char="§"/>
+            </a:pPr>
+            <a:r>
+              <a:rPr lang="en-US" sz="2000" b="1" i="0" u="none" strike="noStrike" dirty="0">
+                <a:solidFill>
+                  <a:srgbClr val="212529"/>
+                </a:solidFill>
+                <a:effectLst/>
+                <a:latin typeface="Arial" panose="020B0604020202020204" pitchFamily="34" charset="0"/>
+              </a:rPr>
+              <a:t>Handle missing data. Drop or impute</a:t>
+            </a:r>
+          </a:p>
+          <a:p>
+            <a:pPr marL="285750" indent="-285750">
+              <a:buFont typeface="Wingdings" panose="05000000000000000000" pitchFamily="2" charset="2"/>
+              <a:buChar char="§"/>
+            </a:pPr>
+            <a:endParaRPr lang="en-US" sz="2000" b="1" dirty="0">
+              <a:solidFill>
+                <a:srgbClr val="212529"/>
+              </a:solidFill>
+              <a:latin typeface="Arial" panose="020B0604020202020204" pitchFamily="34" charset="0"/>
+            </a:endParaRPr>
+          </a:p>
+          <a:p>
+            <a:pPr marL="285750" indent="-285750">
+              <a:buFont typeface="Wingdings" panose="05000000000000000000" pitchFamily="2" charset="2"/>
+              <a:buChar char="§"/>
+            </a:pPr>
+            <a:r>
+              <a:rPr lang="en-US" sz="2000" b="1" i="0" u="none" strike="noStrike" dirty="0">
+                <a:solidFill>
+                  <a:srgbClr val="212529"/>
+                </a:solidFill>
+                <a:effectLst/>
+                <a:latin typeface="Arial" panose="020B0604020202020204" pitchFamily="34" charset="0"/>
+              </a:rPr>
+              <a:t>Identify outliers, remove or convert into numbers</a:t>
+            </a:r>
+          </a:p>
+          <a:p>
+            <a:pPr marL="285750" indent="-285750">
+              <a:buFont typeface="Wingdings" panose="05000000000000000000" pitchFamily="2" charset="2"/>
+              <a:buChar char="§"/>
+            </a:pPr>
+            <a:endParaRPr lang="en-US" sz="2000" b="1" i="0" u="none" strike="noStrike" dirty="0">
+              <a:solidFill>
+                <a:srgbClr val="212529"/>
+              </a:solidFill>
+              <a:effectLst/>
+              <a:latin typeface="Arial" panose="020B0604020202020204" pitchFamily="34" charset="0"/>
+            </a:endParaRPr>
+          </a:p>
+          <a:p>
+            <a:pPr marL="285750" indent="-285750">
+              <a:buFont typeface="Wingdings" panose="05000000000000000000" pitchFamily="2" charset="2"/>
+              <a:buChar char="§"/>
+            </a:pPr>
+            <a:r>
+              <a:rPr lang="en-US" sz="2000" b="1" i="0" u="none" strike="noStrike" dirty="0">
+                <a:solidFill>
+                  <a:srgbClr val="212529"/>
+                </a:solidFill>
+                <a:effectLst/>
+                <a:latin typeface="Arial" panose="020B0604020202020204" pitchFamily="34" charset="0"/>
+              </a:rPr>
+              <a:t>Separate dependent feature from independent features</a:t>
+            </a:r>
+          </a:p>
+          <a:p>
+            <a:pPr marL="285750" indent="-285750">
+              <a:buFont typeface="Wingdings" panose="05000000000000000000" pitchFamily="2" charset="2"/>
+              <a:buChar char="§"/>
+            </a:pPr>
+            <a:endParaRPr lang="en-US" sz="2000" b="1" dirty="0">
+              <a:solidFill>
+                <a:srgbClr val="212529"/>
+              </a:solidFill>
+              <a:latin typeface="Arial" panose="020B0604020202020204" pitchFamily="34" charset="0"/>
+            </a:endParaRPr>
+          </a:p>
+          <a:p>
+            <a:pPr marL="285750" indent="-285750">
+              <a:buFont typeface="Wingdings" panose="05000000000000000000" pitchFamily="2" charset="2"/>
+              <a:buChar char="§"/>
+            </a:pPr>
+            <a:r>
+              <a:rPr lang="en-US" sz="2000" b="1" i="0" u="none" strike="noStrike" dirty="0">
+                <a:solidFill>
+                  <a:srgbClr val="212529"/>
+                </a:solidFill>
+                <a:effectLst/>
+                <a:latin typeface="Arial" panose="020B0604020202020204" pitchFamily="34" charset="0"/>
+              </a:rPr>
+              <a:t>Gaussian- continuous data, need to be distributed normally</a:t>
+            </a:r>
+          </a:p>
+          <a:p>
+            <a:endParaRPr lang="en-US" sz="2000" b="1" i="0" u="none" strike="noStrike" dirty="0">
+              <a:solidFill>
+                <a:srgbClr val="212529"/>
+              </a:solidFill>
+              <a:effectLst/>
+              <a:latin typeface="Arial" panose="020B0604020202020204" pitchFamily="34" charset="0"/>
+            </a:endParaRPr>
+          </a:p>
+          <a:p>
+            <a:pPr marL="285750" indent="-285750">
+              <a:buFont typeface="Wingdings" panose="05000000000000000000" pitchFamily="2" charset="2"/>
+              <a:buChar char="§"/>
+            </a:pPr>
+            <a:r>
+              <a:rPr lang="en-US" sz="2000" b="1" i="0" u="none" strike="noStrike" dirty="0">
+                <a:solidFill>
+                  <a:srgbClr val="212529"/>
+                </a:solidFill>
+                <a:effectLst/>
+                <a:latin typeface="Arial" panose="020B0604020202020204" pitchFamily="34" charset="0"/>
+              </a:rPr>
+              <a:t>Data smoothing- so that no probabilities are completely zero</a:t>
+            </a:r>
+          </a:p>
+          <a:p>
+            <a:endParaRPr lang="en-US" sz="2000" dirty="0"/>
+          </a:p>
+        </p:txBody>
+      </p:sp>
+    </p:spTree>
+    <p:extLst>
+      <p:ext uri="{BB962C8B-B14F-4D97-AF65-F5344CB8AC3E}">
+        <p14:creationId xmlns:p14="http://schemas.microsoft.com/office/powerpoint/2010/main" val="3624365938"/>
+      </p:ext>
+    </p:extLst>
+  </p:cSld>
+  <p:clrMapOvr>
+    <a:masterClrMapping/>
+  </p:clrMapOvr>
+</p:sld>
+</file>
+
+<file path=ppt/slides/slide7.xml><?xml version="1.0" encoding="utf-8"?>
 <p:sld xmlns:a="http://schemas.openxmlformats.org/drawingml/2006/main" xmlns:r="http://schemas.openxmlformats.org/officeDocument/2006/relationships" xmlns:p="http://schemas.openxmlformats.org/presentationml/2006/main">
   <p:cSld>
     <p:spTree>

</xml_diff>

<commit_message>
Adding PDF version of presentation
</commit_message>
<xml_diff>
--- a/Naive Bayes Notes.pptx
+++ b/Naive Bayes Notes.pptx
@@ -8788,21 +8788,21 @@
 </file>
 
 <file path=customXml/item2.xml><?xml version="1.0" encoding="utf-8"?>
+<p:properties xmlns:p="http://schemas.microsoft.com/office/2006/metadata/properties" xmlns:xsi="http://www.w3.org/2001/XMLSchema-instance" xmlns:pc="http://schemas.microsoft.com/office/infopath/2007/PartnerControls">
+  <documentManagement>
+    <Status xmlns="71af3243-3dd4-4a8d-8c0d-dd76da1f02a5">Not started</Status>
+    <MediaServiceKeyPoints xmlns="71af3243-3dd4-4a8d-8c0d-dd76da1f02a5" xsi:nil="true"/>
+  </documentManagement>
+</p:properties>
+</file>
+
+<file path=customXml/item3.xml><?xml version="1.0" encoding="utf-8"?>
 <?mso-contentType ?>
 <FormTemplates xmlns="http://schemas.microsoft.com/sharepoint/v3/contenttype/forms">
   <Display>DocumentLibraryForm</Display>
   <Edit>DocumentLibraryForm</Edit>
   <New>DocumentLibraryForm</New>
 </FormTemplates>
-</file>
-
-<file path=customXml/item3.xml><?xml version="1.0" encoding="utf-8"?>
-<p:properties xmlns:p="http://schemas.microsoft.com/office/2006/metadata/properties" xmlns:xsi="http://www.w3.org/2001/XMLSchema-instance" xmlns:pc="http://schemas.microsoft.com/office/infopath/2007/PartnerControls">
-  <documentManagement>
-    <Status xmlns="71af3243-3dd4-4a8d-8c0d-dd76da1f02a5">Not started</Status>
-    <MediaServiceKeyPoints xmlns="71af3243-3dd4-4a8d-8c0d-dd76da1f02a5" xsi:nil="true"/>
-  </documentManagement>
-</p:properties>
 </file>
 
 <file path=customXml/itemProps1.xml><?xml version="1.0" encoding="utf-8"?>
@@ -8825,19 +8825,26 @@
 </file>
 
 <file path=customXml/itemProps2.xml><?xml version="1.0" encoding="utf-8"?>
+<ds:datastoreItem xmlns:ds="http://schemas.openxmlformats.org/officeDocument/2006/customXml" ds:itemID="{A03EEFF0-FB57-4CB4-8BFC-DF397689E2ED}">
+  <ds:schemaRefs>
+    <ds:schemaRef ds:uri="http://schemas.microsoft.com/office/2006/documentManagement/types"/>
+    <ds:schemaRef ds:uri="http://schemas.openxmlformats.org/package/2006/metadata/core-properties"/>
+    <ds:schemaRef ds:uri="http://purl.org/dc/terms/"/>
+    <ds:schemaRef ds:uri="http://www.w3.org/XML/1998/namespace"/>
+    <ds:schemaRef ds:uri="16c05727-aa75-4e4a-9b5f-8a80a1165891"/>
+    <ds:schemaRef ds:uri="71af3243-3dd4-4a8d-8c0d-dd76da1f02a5"/>
+    <ds:schemaRef ds:uri="http://schemas.microsoft.com/office/infopath/2007/PartnerControls"/>
+    <ds:schemaRef ds:uri="http://schemas.microsoft.com/office/2006/metadata/properties"/>
+    <ds:schemaRef ds:uri="http://purl.org/dc/dcmitype/"/>
+    <ds:schemaRef ds:uri="http://purl.org/dc/elements/1.1/"/>
+  </ds:schemaRefs>
+</ds:datastoreItem>
+</file>
+
+<file path=customXml/itemProps3.xml><?xml version="1.0" encoding="utf-8"?>
 <ds:datastoreItem xmlns:ds="http://schemas.openxmlformats.org/officeDocument/2006/customXml" ds:itemID="{AA3F7EDC-E5B4-4BBC-9D2A-CBE6D46C37AD}">
   <ds:schemaRefs>
     <ds:schemaRef ds:uri="http://schemas.microsoft.com/sharepoint/v3/contenttype/forms"/>
   </ds:schemaRefs>
 </ds:datastoreItem>
-</file>
-
-<file path=customXml/itemProps3.xml><?xml version="1.0" encoding="utf-8"?>
-<ds:datastoreItem xmlns:ds="http://schemas.openxmlformats.org/officeDocument/2006/customXml" ds:itemID="{A03EEFF0-FB57-4CB4-8BFC-DF397689E2ED}">
-  <ds:schemaRefs>
-    <ds:schemaRef ds:uri="http://schemas.microsoft.com/office/2006/metadata/properties"/>
-    <ds:schemaRef ds:uri="http://schemas.microsoft.com/office/infopath/2007/PartnerControls"/>
-    <ds:schemaRef ds:uri="71af3243-3dd4-4a8d-8c0d-dd76da1f02a5"/>
-  </ds:schemaRefs>
-</ds:datastoreItem>
 </file>
</xml_diff>